<commit_message>
Revert "I am testing"
This reverts commit d980afbf8bb8fe891b66276b66a6669fe8d8fd1b.
</commit_message>
<xml_diff>
--- a/Presentation for class on 6-5.pptx
+++ b/Presentation for class on 6-5.pptx
@@ -1,6 +1,6 @@
 
 <file path=ppt/presentation.xml><?xml version="1.0" encoding="utf-8"?>
-<p:presentation xmlns:a="http://schemas.openxmlformats.org/drawingml/2006/main" xmlns:r="http://schemas.openxmlformats.org/officeDocument/2006/relationships" xmlns:mc="http://schemas.openxmlformats.org/markup-compatibility/2006" xmlns:mv="urn:schemas-microsoft-com:mac:vml" xmlns:p="http://schemas.openxmlformats.org/presentationml/2006/main" mc:Ignorable="mv" mc:PreserveAttributes="mv:*" saveSubsetFonts="1">
+<p:presentation xmlns:a="http://schemas.openxmlformats.org/drawingml/2006/main" xmlns:r="http://schemas.openxmlformats.org/officeDocument/2006/relationships" xmlns:p="http://schemas.openxmlformats.org/presentationml/2006/main" saveSubsetFonts="1">
   <p:sldMasterIdLst>
     <p:sldMasterId id="2147483648" r:id="rId1"/>
   </p:sldMasterIdLst>
@@ -108,7 +108,7 @@
 </file>
 
 <file path=ppt/slideLayouts/slideLayout1.xml><?xml version="1.0" encoding="utf-8"?>
-<p:sldLayout xmlns:a="http://schemas.openxmlformats.org/drawingml/2006/main" xmlns:r="http://schemas.openxmlformats.org/officeDocument/2006/relationships" xmlns:mc="http://schemas.openxmlformats.org/markup-compatibility/2006" xmlns:mv="urn:schemas-microsoft-com:mac:vml" xmlns:p="http://schemas.openxmlformats.org/presentationml/2006/main" mc:Ignorable="mv" mc:PreserveAttributes="mv:*" type="title" preserve="1">
+<p:sldLayout xmlns:a="http://schemas.openxmlformats.org/drawingml/2006/main" xmlns:r="http://schemas.openxmlformats.org/officeDocument/2006/relationships" xmlns:p="http://schemas.openxmlformats.org/presentationml/2006/main" type="title" preserve="1">
   <p:cSld name="Title Slide">
     <p:spTree>
       <p:nvGrpSpPr>
@@ -288,8 +288,7 @@
           <a:p>
             <a:fld id="{AF7A9661-BEA6-485E-B3F1-C3611FCE0C8D}" type="datetimeFigureOut">
               <a:rPr lang="en-US" smtClean="0"/>
-              <a:pPr/>
-              <a:t>6/4/13</a:t>
+              <a:t>6/4/2013</a:t>
             </a:fld>
             <a:endParaRPr lang="en-US"/>
           </a:p>
@@ -331,7 +330,6 @@
           <a:p>
             <a:fld id="{354FD10D-003F-4CC3-B558-9640A193A037}" type="slidenum">
               <a:rPr lang="en-US" smtClean="0"/>
-              <a:pPr/>
               <a:t>‹#›</a:t>
             </a:fld>
             <a:endParaRPr lang="en-US"/>
@@ -341,7 +339,7 @@
     </p:spTree>
     <p:extLst>
       <p:ext uri="{BB962C8B-B14F-4D97-AF65-F5344CB8AC3E}">
-        <p14:creationId xmlns:p14="http://schemas.microsoft.com/office/powerpoint/2010/main" xmlns:p="http://schemas.openxmlformats.org/presentationml/2006/main" xmlns:r="http://schemas.openxmlformats.org/officeDocument/2006/relationships" xmlns:a="http://schemas.openxmlformats.org/drawingml/2006/main" xmlns="" val="1379820628"/>
+        <p14:creationId xmlns:p14="http://schemas.microsoft.com/office/powerpoint/2010/main" val="1379820628"/>
       </p:ext>
     </p:extLst>
   </p:cSld>
@@ -352,7 +350,7 @@
 </file>
 
 <file path=ppt/slideLayouts/slideLayout10.xml><?xml version="1.0" encoding="utf-8"?>
-<p:sldLayout xmlns:a="http://schemas.openxmlformats.org/drawingml/2006/main" xmlns:r="http://schemas.openxmlformats.org/officeDocument/2006/relationships" xmlns:mc="http://schemas.openxmlformats.org/markup-compatibility/2006" xmlns:mv="urn:schemas-microsoft-com:mac:vml" xmlns:p="http://schemas.openxmlformats.org/presentationml/2006/main" mc:Ignorable="mv" mc:PreserveAttributes="mv:*" type="vertTx" preserve="1">
+<p:sldLayout xmlns:a="http://schemas.openxmlformats.org/drawingml/2006/main" xmlns:r="http://schemas.openxmlformats.org/officeDocument/2006/relationships" xmlns:p="http://schemas.openxmlformats.org/presentationml/2006/main" type="vertTx" preserve="1">
   <p:cSld name="Title and Vertical Text">
     <p:spTree>
       <p:nvGrpSpPr>
@@ -460,8 +458,7 @@
           <a:p>
             <a:fld id="{AF7A9661-BEA6-485E-B3F1-C3611FCE0C8D}" type="datetimeFigureOut">
               <a:rPr lang="en-US" smtClean="0"/>
-              <a:pPr/>
-              <a:t>6/4/13</a:t>
+              <a:t>6/4/2013</a:t>
             </a:fld>
             <a:endParaRPr lang="en-US"/>
           </a:p>
@@ -503,7 +500,6 @@
           <a:p>
             <a:fld id="{354FD10D-003F-4CC3-B558-9640A193A037}" type="slidenum">
               <a:rPr lang="en-US" smtClean="0"/>
-              <a:pPr/>
               <a:t>‹#›</a:t>
             </a:fld>
             <a:endParaRPr lang="en-US"/>
@@ -513,7 +509,7 @@
     </p:spTree>
     <p:extLst>
       <p:ext uri="{BB962C8B-B14F-4D97-AF65-F5344CB8AC3E}">
-        <p14:creationId xmlns:p14="http://schemas.microsoft.com/office/powerpoint/2010/main" xmlns:p="http://schemas.openxmlformats.org/presentationml/2006/main" xmlns:r="http://schemas.openxmlformats.org/officeDocument/2006/relationships" xmlns:a="http://schemas.openxmlformats.org/drawingml/2006/main" xmlns="" val="1430340604"/>
+        <p14:creationId xmlns:p14="http://schemas.microsoft.com/office/powerpoint/2010/main" val="1430340604"/>
       </p:ext>
     </p:extLst>
   </p:cSld>
@@ -524,7 +520,7 @@
 </file>
 
 <file path=ppt/slideLayouts/slideLayout11.xml><?xml version="1.0" encoding="utf-8"?>
-<p:sldLayout xmlns:a="http://schemas.openxmlformats.org/drawingml/2006/main" xmlns:r="http://schemas.openxmlformats.org/officeDocument/2006/relationships" xmlns:mc="http://schemas.openxmlformats.org/markup-compatibility/2006" xmlns:mv="urn:schemas-microsoft-com:mac:vml" xmlns:p="http://schemas.openxmlformats.org/presentationml/2006/main" mc:Ignorable="mv" mc:PreserveAttributes="mv:*" type="vertTitleAndTx" preserve="1">
+<p:sldLayout xmlns:a="http://schemas.openxmlformats.org/drawingml/2006/main" xmlns:r="http://schemas.openxmlformats.org/officeDocument/2006/relationships" xmlns:p="http://schemas.openxmlformats.org/presentationml/2006/main" type="vertTitleAndTx" preserve="1">
   <p:cSld name="Vertical Title and Text">
     <p:spTree>
       <p:nvGrpSpPr>
@@ -642,8 +638,7 @@
           <a:p>
             <a:fld id="{AF7A9661-BEA6-485E-B3F1-C3611FCE0C8D}" type="datetimeFigureOut">
               <a:rPr lang="en-US" smtClean="0"/>
-              <a:pPr/>
-              <a:t>6/4/13</a:t>
+              <a:t>6/4/2013</a:t>
             </a:fld>
             <a:endParaRPr lang="en-US"/>
           </a:p>
@@ -685,7 +680,6 @@
           <a:p>
             <a:fld id="{354FD10D-003F-4CC3-B558-9640A193A037}" type="slidenum">
               <a:rPr lang="en-US" smtClean="0"/>
-              <a:pPr/>
               <a:t>‹#›</a:t>
             </a:fld>
             <a:endParaRPr lang="en-US"/>
@@ -695,7 +689,7 @@
     </p:spTree>
     <p:extLst>
       <p:ext uri="{BB962C8B-B14F-4D97-AF65-F5344CB8AC3E}">
-        <p14:creationId xmlns:p14="http://schemas.microsoft.com/office/powerpoint/2010/main" xmlns:p="http://schemas.openxmlformats.org/presentationml/2006/main" xmlns:r="http://schemas.openxmlformats.org/officeDocument/2006/relationships" xmlns:a="http://schemas.openxmlformats.org/drawingml/2006/main" xmlns="" val="694691408"/>
+        <p14:creationId xmlns:p14="http://schemas.microsoft.com/office/powerpoint/2010/main" val="694691408"/>
       </p:ext>
     </p:extLst>
   </p:cSld>
@@ -706,7 +700,7 @@
 </file>
 
 <file path=ppt/slideLayouts/slideLayout2.xml><?xml version="1.0" encoding="utf-8"?>
-<p:sldLayout xmlns:a="http://schemas.openxmlformats.org/drawingml/2006/main" xmlns:r="http://schemas.openxmlformats.org/officeDocument/2006/relationships" xmlns:mc="http://schemas.openxmlformats.org/markup-compatibility/2006" xmlns:mv="urn:schemas-microsoft-com:mac:vml" xmlns:p="http://schemas.openxmlformats.org/presentationml/2006/main" mc:Ignorable="mv" mc:PreserveAttributes="mv:*" type="obj" preserve="1">
+<p:sldLayout xmlns:a="http://schemas.openxmlformats.org/drawingml/2006/main" xmlns:r="http://schemas.openxmlformats.org/officeDocument/2006/relationships" xmlns:p="http://schemas.openxmlformats.org/presentationml/2006/main" type="obj" preserve="1">
   <p:cSld name="Title and Content">
     <p:spTree>
       <p:nvGrpSpPr>
@@ -814,8 +808,7 @@
           <a:p>
             <a:fld id="{AF7A9661-BEA6-485E-B3F1-C3611FCE0C8D}" type="datetimeFigureOut">
               <a:rPr lang="en-US" smtClean="0"/>
-              <a:pPr/>
-              <a:t>6/4/13</a:t>
+              <a:t>6/4/2013</a:t>
             </a:fld>
             <a:endParaRPr lang="en-US"/>
           </a:p>
@@ -857,7 +850,6 @@
           <a:p>
             <a:fld id="{354FD10D-003F-4CC3-B558-9640A193A037}" type="slidenum">
               <a:rPr lang="en-US" smtClean="0"/>
-              <a:pPr/>
               <a:t>‹#›</a:t>
             </a:fld>
             <a:endParaRPr lang="en-US"/>
@@ -867,7 +859,7 @@
     </p:spTree>
     <p:extLst>
       <p:ext uri="{BB962C8B-B14F-4D97-AF65-F5344CB8AC3E}">
-        <p14:creationId xmlns:p14="http://schemas.microsoft.com/office/powerpoint/2010/main" xmlns:p="http://schemas.openxmlformats.org/presentationml/2006/main" xmlns:r="http://schemas.openxmlformats.org/officeDocument/2006/relationships" xmlns:a="http://schemas.openxmlformats.org/drawingml/2006/main" xmlns="" val="3933206334"/>
+        <p14:creationId xmlns:p14="http://schemas.microsoft.com/office/powerpoint/2010/main" val="3933206334"/>
       </p:ext>
     </p:extLst>
   </p:cSld>
@@ -878,7 +870,7 @@
 </file>
 
 <file path=ppt/slideLayouts/slideLayout3.xml><?xml version="1.0" encoding="utf-8"?>
-<p:sldLayout xmlns:a="http://schemas.openxmlformats.org/drawingml/2006/main" xmlns:r="http://schemas.openxmlformats.org/officeDocument/2006/relationships" xmlns:mc="http://schemas.openxmlformats.org/markup-compatibility/2006" xmlns:mv="urn:schemas-microsoft-com:mac:vml" xmlns:p="http://schemas.openxmlformats.org/presentationml/2006/main" mc:Ignorable="mv" mc:PreserveAttributes="mv:*" type="secHead" preserve="1">
+<p:sldLayout xmlns:a="http://schemas.openxmlformats.org/drawingml/2006/main" xmlns:r="http://schemas.openxmlformats.org/officeDocument/2006/relationships" xmlns:p="http://schemas.openxmlformats.org/presentationml/2006/main" type="secHead" preserve="1">
   <p:cSld name="Section Header">
     <p:spTree>
       <p:nvGrpSpPr>
@@ -1062,8 +1054,7 @@
           <a:p>
             <a:fld id="{AF7A9661-BEA6-485E-B3F1-C3611FCE0C8D}" type="datetimeFigureOut">
               <a:rPr lang="en-US" smtClean="0"/>
-              <a:pPr/>
-              <a:t>6/4/13</a:t>
+              <a:t>6/4/2013</a:t>
             </a:fld>
             <a:endParaRPr lang="en-US"/>
           </a:p>
@@ -1105,7 +1096,6 @@
           <a:p>
             <a:fld id="{354FD10D-003F-4CC3-B558-9640A193A037}" type="slidenum">
               <a:rPr lang="en-US" smtClean="0"/>
-              <a:pPr/>
               <a:t>‹#›</a:t>
             </a:fld>
             <a:endParaRPr lang="en-US"/>
@@ -1115,7 +1105,7 @@
     </p:spTree>
     <p:extLst>
       <p:ext uri="{BB962C8B-B14F-4D97-AF65-F5344CB8AC3E}">
-        <p14:creationId xmlns:p14="http://schemas.microsoft.com/office/powerpoint/2010/main" xmlns:p="http://schemas.openxmlformats.org/presentationml/2006/main" xmlns:r="http://schemas.openxmlformats.org/officeDocument/2006/relationships" xmlns:a="http://schemas.openxmlformats.org/drawingml/2006/main" xmlns="" val="1961362043"/>
+        <p14:creationId xmlns:p14="http://schemas.microsoft.com/office/powerpoint/2010/main" val="1961362043"/>
       </p:ext>
     </p:extLst>
   </p:cSld>
@@ -1126,7 +1116,7 @@
 </file>
 
 <file path=ppt/slideLayouts/slideLayout4.xml><?xml version="1.0" encoding="utf-8"?>
-<p:sldLayout xmlns:a="http://schemas.openxmlformats.org/drawingml/2006/main" xmlns:r="http://schemas.openxmlformats.org/officeDocument/2006/relationships" xmlns:mc="http://schemas.openxmlformats.org/markup-compatibility/2006" xmlns:mv="urn:schemas-microsoft-com:mac:vml" xmlns:p="http://schemas.openxmlformats.org/presentationml/2006/main" mc:Ignorable="mv" mc:PreserveAttributes="mv:*" type="twoObj" preserve="1">
+<p:sldLayout xmlns:a="http://schemas.openxmlformats.org/drawingml/2006/main" xmlns:r="http://schemas.openxmlformats.org/officeDocument/2006/relationships" xmlns:p="http://schemas.openxmlformats.org/presentationml/2006/main" type="twoObj" preserve="1">
   <p:cSld name="Two Content">
     <p:spTree>
       <p:nvGrpSpPr>
@@ -1352,8 +1342,7 @@
           <a:p>
             <a:fld id="{AF7A9661-BEA6-485E-B3F1-C3611FCE0C8D}" type="datetimeFigureOut">
               <a:rPr lang="en-US" smtClean="0"/>
-              <a:pPr/>
-              <a:t>6/4/13</a:t>
+              <a:t>6/4/2013</a:t>
             </a:fld>
             <a:endParaRPr lang="en-US"/>
           </a:p>
@@ -1395,7 +1384,6 @@
           <a:p>
             <a:fld id="{354FD10D-003F-4CC3-B558-9640A193A037}" type="slidenum">
               <a:rPr lang="en-US" smtClean="0"/>
-              <a:pPr/>
               <a:t>‹#›</a:t>
             </a:fld>
             <a:endParaRPr lang="en-US"/>
@@ -1405,7 +1393,7 @@
     </p:spTree>
     <p:extLst>
       <p:ext uri="{BB962C8B-B14F-4D97-AF65-F5344CB8AC3E}">
-        <p14:creationId xmlns:p14="http://schemas.microsoft.com/office/powerpoint/2010/main" xmlns:p="http://schemas.openxmlformats.org/presentationml/2006/main" xmlns:r="http://schemas.openxmlformats.org/officeDocument/2006/relationships" xmlns:a="http://schemas.openxmlformats.org/drawingml/2006/main" xmlns="" val="4075625262"/>
+        <p14:creationId xmlns:p14="http://schemas.microsoft.com/office/powerpoint/2010/main" val="4075625262"/>
       </p:ext>
     </p:extLst>
   </p:cSld>
@@ -1416,7 +1404,7 @@
 </file>
 
 <file path=ppt/slideLayouts/slideLayout5.xml><?xml version="1.0" encoding="utf-8"?>
-<p:sldLayout xmlns:a="http://schemas.openxmlformats.org/drawingml/2006/main" xmlns:r="http://schemas.openxmlformats.org/officeDocument/2006/relationships" xmlns:mc="http://schemas.openxmlformats.org/markup-compatibility/2006" xmlns:mv="urn:schemas-microsoft-com:mac:vml" xmlns:p="http://schemas.openxmlformats.org/presentationml/2006/main" mc:Ignorable="mv" mc:PreserveAttributes="mv:*" type="twoTxTwoObj" preserve="1">
+<p:sldLayout xmlns:a="http://schemas.openxmlformats.org/drawingml/2006/main" xmlns:r="http://schemas.openxmlformats.org/officeDocument/2006/relationships" xmlns:p="http://schemas.openxmlformats.org/presentationml/2006/main" type="twoTxTwoObj" preserve="1">
   <p:cSld name="Comparison">
     <p:spTree>
       <p:nvGrpSpPr>
@@ -1776,8 +1764,7 @@
           <a:p>
             <a:fld id="{AF7A9661-BEA6-485E-B3F1-C3611FCE0C8D}" type="datetimeFigureOut">
               <a:rPr lang="en-US" smtClean="0"/>
-              <a:pPr/>
-              <a:t>6/4/13</a:t>
+              <a:t>6/4/2013</a:t>
             </a:fld>
             <a:endParaRPr lang="en-US"/>
           </a:p>
@@ -1819,7 +1806,6 @@
           <a:p>
             <a:fld id="{354FD10D-003F-4CC3-B558-9640A193A037}" type="slidenum">
               <a:rPr lang="en-US" smtClean="0"/>
-              <a:pPr/>
               <a:t>‹#›</a:t>
             </a:fld>
             <a:endParaRPr lang="en-US"/>
@@ -1829,7 +1815,7 @@
     </p:spTree>
     <p:extLst>
       <p:ext uri="{BB962C8B-B14F-4D97-AF65-F5344CB8AC3E}">
-        <p14:creationId xmlns:p14="http://schemas.microsoft.com/office/powerpoint/2010/main" xmlns:p="http://schemas.openxmlformats.org/presentationml/2006/main" xmlns:r="http://schemas.openxmlformats.org/officeDocument/2006/relationships" xmlns:a="http://schemas.openxmlformats.org/drawingml/2006/main" xmlns="" val="1964481049"/>
+        <p14:creationId xmlns:p14="http://schemas.microsoft.com/office/powerpoint/2010/main" val="1964481049"/>
       </p:ext>
     </p:extLst>
   </p:cSld>
@@ -1840,7 +1826,7 @@
 </file>
 
 <file path=ppt/slideLayouts/slideLayout6.xml><?xml version="1.0" encoding="utf-8"?>
-<p:sldLayout xmlns:a="http://schemas.openxmlformats.org/drawingml/2006/main" xmlns:r="http://schemas.openxmlformats.org/officeDocument/2006/relationships" xmlns:mc="http://schemas.openxmlformats.org/markup-compatibility/2006" xmlns:mv="urn:schemas-microsoft-com:mac:vml" xmlns:p="http://schemas.openxmlformats.org/presentationml/2006/main" mc:Ignorable="mv" mc:PreserveAttributes="mv:*" type="titleOnly" preserve="1">
+<p:sldLayout xmlns:a="http://schemas.openxmlformats.org/drawingml/2006/main" xmlns:r="http://schemas.openxmlformats.org/officeDocument/2006/relationships" xmlns:p="http://schemas.openxmlformats.org/presentationml/2006/main" type="titleOnly" preserve="1">
   <p:cSld name="Title Only">
     <p:spTree>
       <p:nvGrpSpPr>
@@ -1896,8 +1882,7 @@
           <a:p>
             <a:fld id="{AF7A9661-BEA6-485E-B3F1-C3611FCE0C8D}" type="datetimeFigureOut">
               <a:rPr lang="en-US" smtClean="0"/>
-              <a:pPr/>
-              <a:t>6/4/13</a:t>
+              <a:t>6/4/2013</a:t>
             </a:fld>
             <a:endParaRPr lang="en-US"/>
           </a:p>
@@ -1939,7 +1924,6 @@
           <a:p>
             <a:fld id="{354FD10D-003F-4CC3-B558-9640A193A037}" type="slidenum">
               <a:rPr lang="en-US" smtClean="0"/>
-              <a:pPr/>
               <a:t>‹#›</a:t>
             </a:fld>
             <a:endParaRPr lang="en-US"/>
@@ -1949,7 +1933,7 @@
     </p:spTree>
     <p:extLst>
       <p:ext uri="{BB962C8B-B14F-4D97-AF65-F5344CB8AC3E}">
-        <p14:creationId xmlns:p14="http://schemas.microsoft.com/office/powerpoint/2010/main" xmlns:p="http://schemas.openxmlformats.org/presentationml/2006/main" xmlns:r="http://schemas.openxmlformats.org/officeDocument/2006/relationships" xmlns:a="http://schemas.openxmlformats.org/drawingml/2006/main" xmlns="" val="1991771599"/>
+        <p14:creationId xmlns:p14="http://schemas.microsoft.com/office/powerpoint/2010/main" val="1991771599"/>
       </p:ext>
     </p:extLst>
   </p:cSld>
@@ -1960,7 +1944,7 @@
 </file>
 
 <file path=ppt/slideLayouts/slideLayout7.xml><?xml version="1.0" encoding="utf-8"?>
-<p:sldLayout xmlns:a="http://schemas.openxmlformats.org/drawingml/2006/main" xmlns:r="http://schemas.openxmlformats.org/officeDocument/2006/relationships" xmlns:mc="http://schemas.openxmlformats.org/markup-compatibility/2006" xmlns:mv="urn:schemas-microsoft-com:mac:vml" xmlns:p="http://schemas.openxmlformats.org/presentationml/2006/main" mc:Ignorable="mv" mc:PreserveAttributes="mv:*" type="blank" preserve="1">
+<p:sldLayout xmlns:a="http://schemas.openxmlformats.org/drawingml/2006/main" xmlns:r="http://schemas.openxmlformats.org/officeDocument/2006/relationships" xmlns:p="http://schemas.openxmlformats.org/presentationml/2006/main" type="blank" preserve="1">
   <p:cSld name="Blank">
     <p:spTree>
       <p:nvGrpSpPr>
@@ -1993,8 +1977,7 @@
           <a:p>
             <a:fld id="{AF7A9661-BEA6-485E-B3F1-C3611FCE0C8D}" type="datetimeFigureOut">
               <a:rPr lang="en-US" smtClean="0"/>
-              <a:pPr/>
-              <a:t>6/4/13</a:t>
+              <a:t>6/4/2013</a:t>
             </a:fld>
             <a:endParaRPr lang="en-US"/>
           </a:p>
@@ -2036,7 +2019,6 @@
           <a:p>
             <a:fld id="{354FD10D-003F-4CC3-B558-9640A193A037}" type="slidenum">
               <a:rPr lang="en-US" smtClean="0"/>
-              <a:pPr/>
               <a:t>‹#›</a:t>
             </a:fld>
             <a:endParaRPr lang="en-US"/>
@@ -2046,7 +2028,7 @@
     </p:spTree>
     <p:extLst>
       <p:ext uri="{BB962C8B-B14F-4D97-AF65-F5344CB8AC3E}">
-        <p14:creationId xmlns:p14="http://schemas.microsoft.com/office/powerpoint/2010/main" xmlns:p="http://schemas.openxmlformats.org/presentationml/2006/main" xmlns:r="http://schemas.openxmlformats.org/officeDocument/2006/relationships" xmlns:a="http://schemas.openxmlformats.org/drawingml/2006/main" xmlns="" val="2894365705"/>
+        <p14:creationId xmlns:p14="http://schemas.microsoft.com/office/powerpoint/2010/main" val="2894365705"/>
       </p:ext>
     </p:extLst>
   </p:cSld>
@@ -2057,7 +2039,7 @@
 </file>
 
 <file path=ppt/slideLayouts/slideLayout8.xml><?xml version="1.0" encoding="utf-8"?>
-<p:sldLayout xmlns:a="http://schemas.openxmlformats.org/drawingml/2006/main" xmlns:r="http://schemas.openxmlformats.org/officeDocument/2006/relationships" xmlns:mc="http://schemas.openxmlformats.org/markup-compatibility/2006" xmlns:mv="urn:schemas-microsoft-com:mac:vml" xmlns:p="http://schemas.openxmlformats.org/presentationml/2006/main" mc:Ignorable="mv" mc:PreserveAttributes="mv:*" type="objTx" preserve="1">
+<p:sldLayout xmlns:a="http://schemas.openxmlformats.org/drawingml/2006/main" xmlns:r="http://schemas.openxmlformats.org/officeDocument/2006/relationships" xmlns:p="http://schemas.openxmlformats.org/presentationml/2006/main" type="objTx" preserve="1">
   <p:cSld name="Content with Caption">
     <p:spTree>
       <p:nvGrpSpPr>
@@ -2272,8 +2254,7 @@
           <a:p>
             <a:fld id="{AF7A9661-BEA6-485E-B3F1-C3611FCE0C8D}" type="datetimeFigureOut">
               <a:rPr lang="en-US" smtClean="0"/>
-              <a:pPr/>
-              <a:t>6/4/13</a:t>
+              <a:t>6/4/2013</a:t>
             </a:fld>
             <a:endParaRPr lang="en-US"/>
           </a:p>
@@ -2315,7 +2296,6 @@
           <a:p>
             <a:fld id="{354FD10D-003F-4CC3-B558-9640A193A037}" type="slidenum">
               <a:rPr lang="en-US" smtClean="0"/>
-              <a:pPr/>
               <a:t>‹#›</a:t>
             </a:fld>
             <a:endParaRPr lang="en-US"/>
@@ -2325,7 +2305,7 @@
     </p:spTree>
     <p:extLst>
       <p:ext uri="{BB962C8B-B14F-4D97-AF65-F5344CB8AC3E}">
-        <p14:creationId xmlns:p14="http://schemas.microsoft.com/office/powerpoint/2010/main" xmlns:p="http://schemas.openxmlformats.org/presentationml/2006/main" xmlns:r="http://schemas.openxmlformats.org/officeDocument/2006/relationships" xmlns:a="http://schemas.openxmlformats.org/drawingml/2006/main" xmlns="" val="1534216186"/>
+        <p14:creationId xmlns:p14="http://schemas.microsoft.com/office/powerpoint/2010/main" val="1534216186"/>
       </p:ext>
     </p:extLst>
   </p:cSld>
@@ -2336,7 +2316,7 @@
 </file>
 
 <file path=ppt/slideLayouts/slideLayout9.xml><?xml version="1.0" encoding="utf-8"?>
-<p:sldLayout xmlns:a="http://schemas.openxmlformats.org/drawingml/2006/main" xmlns:r="http://schemas.openxmlformats.org/officeDocument/2006/relationships" xmlns:mc="http://schemas.openxmlformats.org/markup-compatibility/2006" xmlns:mv="urn:schemas-microsoft-com:mac:vml" xmlns:p="http://schemas.openxmlformats.org/presentationml/2006/main" mc:Ignorable="mv" mc:PreserveAttributes="mv:*" type="picTx" preserve="1">
+<p:sldLayout xmlns:a="http://schemas.openxmlformats.org/drawingml/2006/main" xmlns:r="http://schemas.openxmlformats.org/officeDocument/2006/relationships" xmlns:p="http://schemas.openxmlformats.org/presentationml/2006/main" type="picTx" preserve="1">
   <p:cSld name="Picture with Caption">
     <p:spTree>
       <p:nvGrpSpPr>
@@ -2527,8 +2507,7 @@
           <a:p>
             <a:fld id="{AF7A9661-BEA6-485E-B3F1-C3611FCE0C8D}" type="datetimeFigureOut">
               <a:rPr lang="en-US" smtClean="0"/>
-              <a:pPr/>
-              <a:t>6/4/13</a:t>
+              <a:t>6/4/2013</a:t>
             </a:fld>
             <a:endParaRPr lang="en-US"/>
           </a:p>
@@ -2570,7 +2549,6 @@
           <a:p>
             <a:fld id="{354FD10D-003F-4CC3-B558-9640A193A037}" type="slidenum">
               <a:rPr lang="en-US" smtClean="0"/>
-              <a:pPr/>
               <a:t>‹#›</a:t>
             </a:fld>
             <a:endParaRPr lang="en-US"/>
@@ -2580,7 +2558,7 @@
     </p:spTree>
     <p:extLst>
       <p:ext uri="{BB962C8B-B14F-4D97-AF65-F5344CB8AC3E}">
-        <p14:creationId xmlns:p14="http://schemas.microsoft.com/office/powerpoint/2010/main" xmlns:p="http://schemas.openxmlformats.org/presentationml/2006/main" xmlns:r="http://schemas.openxmlformats.org/officeDocument/2006/relationships" xmlns:a="http://schemas.openxmlformats.org/drawingml/2006/main" xmlns="" val="3315781508"/>
+        <p14:creationId xmlns:p14="http://schemas.microsoft.com/office/powerpoint/2010/main" val="3315781508"/>
       </p:ext>
     </p:extLst>
   </p:cSld>
@@ -2591,7 +2569,7 @@
 </file>
 
 <file path=ppt/slideMasters/slideMaster1.xml><?xml version="1.0" encoding="utf-8"?>
-<p:sldMaster xmlns:a="http://schemas.openxmlformats.org/drawingml/2006/main" xmlns:r="http://schemas.openxmlformats.org/officeDocument/2006/relationships" xmlns:mc="http://schemas.openxmlformats.org/markup-compatibility/2006" xmlns:mv="urn:schemas-microsoft-com:mac:vml" xmlns:p="http://schemas.openxmlformats.org/presentationml/2006/main" mc:Ignorable="mv" mc:PreserveAttributes="mv:*">
+<p:sldMaster xmlns:a="http://schemas.openxmlformats.org/drawingml/2006/main" xmlns:r="http://schemas.openxmlformats.org/officeDocument/2006/relationships" xmlns:p="http://schemas.openxmlformats.org/presentationml/2006/main">
   <p:cSld>
     <p:bg>
       <p:bgRef idx="1001">
@@ -2742,8 +2720,7 @@
           <a:p>
             <a:fld id="{AF7A9661-BEA6-485E-B3F1-C3611FCE0C8D}" type="datetimeFigureOut">
               <a:rPr lang="en-US" smtClean="0"/>
-              <a:pPr/>
-              <a:t>6/4/13</a:t>
+              <a:t>6/4/2013</a:t>
             </a:fld>
             <a:endParaRPr lang="en-US"/>
           </a:p>
@@ -2821,7 +2798,6 @@
           <a:p>
             <a:fld id="{354FD10D-003F-4CC3-B558-9640A193A037}" type="slidenum">
               <a:rPr lang="en-US" smtClean="0"/>
-              <a:pPr/>
               <a:t>‹#›</a:t>
             </a:fld>
             <a:endParaRPr lang="en-US"/>
@@ -2831,7 +2807,7 @@
     </p:spTree>
     <p:extLst>
       <p:ext uri="{BB962C8B-B14F-4D97-AF65-F5344CB8AC3E}">
-        <p14:creationId xmlns:p14="http://schemas.microsoft.com/office/powerpoint/2010/main" xmlns:p="http://schemas.openxmlformats.org/presentationml/2006/main" xmlns:r="http://schemas.openxmlformats.org/officeDocument/2006/relationships" xmlns:a="http://schemas.openxmlformats.org/drawingml/2006/main" xmlns="" val="594847327"/>
+        <p14:creationId xmlns:p14="http://schemas.microsoft.com/office/powerpoint/2010/main" val="594847327"/>
       </p:ext>
     </p:extLst>
   </p:cSld>
@@ -3103,7 +3079,7 @@
 </file>
 
 <file path=ppt/slides/slide1.xml><?xml version="1.0" encoding="utf-8"?>
-<p:sld xmlns:a="http://schemas.openxmlformats.org/drawingml/2006/main" xmlns:r="http://schemas.openxmlformats.org/officeDocument/2006/relationships" xmlns:mc="http://schemas.openxmlformats.org/markup-compatibility/2006" xmlns:mv="urn:schemas-microsoft-com:mac:vml" xmlns:p="http://schemas.openxmlformats.org/presentationml/2006/main" mc:Ignorable="mv" mc:PreserveAttributes="mv:*">
+<p:sld xmlns:a="http://schemas.openxmlformats.org/drawingml/2006/main" xmlns:r="http://schemas.openxmlformats.org/officeDocument/2006/relationships" xmlns:p="http://schemas.openxmlformats.org/presentationml/2006/main">
   <p:cSld>
     <p:spTree>
       <p:nvGrpSpPr>
@@ -3191,29 +3167,15 @@
           <a:p>
             <a:r>
               <a:rPr lang="en-US" sz="2400" dirty="0" smtClean="0"/>
-              <a:t>Check for win </a:t>
-            </a:r>
-            <a:r>
-              <a:rPr lang="en-US" sz="2400" dirty="0" smtClean="0"/>
-              <a:t>conditions </a:t>
-            </a:r>
-          </a:p>
-          <a:p>
-            <a:endParaRPr lang="en-US" sz="2400" dirty="0" smtClean="0"/>
-          </a:p>
-          <a:p>
-            <a:r>
-              <a:rPr lang="en-US" sz="2400" smtClean="0"/>
-              <a:t>falalalalllal</a:t>
-            </a:r>
-            <a:endParaRPr lang="en-US" sz="2400" dirty="0" smtClean="0"/>
+              <a:t>Check for win conditions</a:t>
+            </a:r>
           </a:p>
         </p:txBody>
       </p:sp>
     </p:spTree>
     <p:extLst>
       <p:ext uri="{BB962C8B-B14F-4D97-AF65-F5344CB8AC3E}">
-        <p14:creationId xmlns:p14="http://schemas.microsoft.com/office/powerpoint/2010/main" xmlns:p="http://schemas.openxmlformats.org/presentationml/2006/main" xmlns:r="http://schemas.openxmlformats.org/officeDocument/2006/relationships" xmlns:a="http://schemas.openxmlformats.org/drawingml/2006/main" xmlns="" val="4102431437"/>
+        <p14:creationId xmlns:p14="http://schemas.microsoft.com/office/powerpoint/2010/main" val="4102431437"/>
       </p:ext>
     </p:extLst>
   </p:cSld>

</xml_diff>